<commit_message>
Updated the Power Point Presentation with a more detailed "about the game" section
</commit_message>
<xml_diff>
--- a/documents/Milestone 1 - Presentation.pptx
+++ b/documents/Milestone 1 - Presentation.pptx
@@ -5,21 +5,20 @@
     <p:sldMasterId id="2147483648" r:id="rId1"/>
   </p:sldMasterIdLst>
   <p:notesMasterIdLst>
-    <p:notesMasterId r:id="rId14"/>
+    <p:notesMasterId r:id="rId13"/>
   </p:notesMasterIdLst>
   <p:sldIdLst>
     <p:sldId id="256" r:id="rId2"/>
     <p:sldId id="257" r:id="rId3"/>
-    <p:sldId id="267" r:id="rId4"/>
-    <p:sldId id="259" r:id="rId5"/>
-    <p:sldId id="258" r:id="rId6"/>
-    <p:sldId id="260" r:id="rId7"/>
-    <p:sldId id="262" r:id="rId8"/>
-    <p:sldId id="263" r:id="rId9"/>
-    <p:sldId id="264" r:id="rId10"/>
-    <p:sldId id="265" r:id="rId11"/>
-    <p:sldId id="266" r:id="rId12"/>
-    <p:sldId id="261" r:id="rId13"/>
+    <p:sldId id="259" r:id="rId4"/>
+    <p:sldId id="258" r:id="rId5"/>
+    <p:sldId id="260" r:id="rId6"/>
+    <p:sldId id="262" r:id="rId7"/>
+    <p:sldId id="263" r:id="rId8"/>
+    <p:sldId id="264" r:id="rId9"/>
+    <p:sldId id="265" r:id="rId10"/>
+    <p:sldId id="266" r:id="rId11"/>
+    <p:sldId id="261" r:id="rId12"/>
   </p:sldIdLst>
   <p:sldSz cx="12192000" cy="6858000"/>
   <p:notesSz cx="6858000" cy="9144000"/>
@@ -574,7 +573,7 @@
           <a:p>
             <a:fld id="{426195BF-5CD1-47F7-A647-173D71A99255}" type="slidenum">
               <a:rPr lang="LID4096" smtClean="0"/>
-              <a:t>8</a:t>
+              <a:t>7</a:t>
             </a:fld>
             <a:endParaRPr lang="LID4096"/>
           </a:p>
@@ -761,7 +760,7 @@
           <a:p>
             <a:fld id="{426195BF-5CD1-47F7-A647-173D71A99255}" type="slidenum">
               <a:rPr lang="LID4096" smtClean="0"/>
-              <a:t>9</a:t>
+              <a:t>8</a:t>
             </a:fld>
             <a:endParaRPr lang="LID4096"/>
           </a:p>
@@ -865,7 +864,7 @@
           <a:p>
             <a:fld id="{426195BF-5CD1-47F7-A647-173D71A99255}" type="slidenum">
               <a:rPr lang="LID4096" smtClean="0"/>
-              <a:t>10</a:t>
+              <a:t>9</a:t>
             </a:fld>
             <a:endParaRPr lang="LID4096"/>
           </a:p>
@@ -975,7 +974,7 @@
           <a:p>
             <a:fld id="{426195BF-5CD1-47F7-A647-173D71A99255}" type="slidenum">
               <a:rPr lang="LID4096" smtClean="0"/>
-              <a:t>11</a:t>
+              <a:t>10</a:t>
             </a:fld>
             <a:endParaRPr lang="LID4096"/>
           </a:p>
@@ -1103,7 +1102,7 @@
           <a:p>
             <a:fld id="{426195BF-5CD1-47F7-A647-173D71A99255}" type="slidenum">
               <a:rPr lang="LID4096" smtClean="0"/>
-              <a:t>12</a:t>
+              <a:t>11</a:t>
             </a:fld>
             <a:endParaRPr lang="LID4096"/>
           </a:p>
@@ -4463,174 +4462,6 @@
       </p:grpSpPr>
       <p:pic>
         <p:nvPicPr>
-          <p:cNvPr id="3" name="Picture 2" descr="Graphical user interface&#10;&#10;Description automatically generated with low confidence">
-            <a:extLst>
-              <a:ext uri="{FF2B5EF4-FFF2-40B4-BE49-F238E27FC236}">
-                <a16:creationId xmlns:a16="http://schemas.microsoft.com/office/drawing/2014/main" id="{58C58301-6A31-42E5-9CC3-E7191E81B312}"/>
-              </a:ext>
-            </a:extLst>
-          </p:cNvPr>
-          <p:cNvPicPr>
-            <a:picLocks noChangeAspect="1"/>
-          </p:cNvPicPr>
-          <p:nvPr/>
-        </p:nvPicPr>
-        <p:blipFill>
-          <a:blip r:embed="rId3">
-            <a:extLst>
-              <a:ext uri="{28A0092B-C50C-407E-A947-70E740481C1C}">
-                <a14:useLocalDpi xmlns:a14="http://schemas.microsoft.com/office/drawing/2010/main" val="0"/>
-              </a:ext>
-            </a:extLst>
-          </a:blip>
-          <a:stretch>
-            <a:fillRect/>
-          </a:stretch>
-        </p:blipFill>
-        <p:spPr>
-          <a:xfrm>
-            <a:off x="594536" y="1001789"/>
-            <a:ext cx="11002927" cy="5251397"/>
-          </a:xfrm>
-          <a:prstGeom prst="rect">
-            <a:avLst/>
-          </a:prstGeom>
-        </p:spPr>
-      </p:pic>
-      <p:sp>
-        <p:nvSpPr>
-          <p:cNvPr id="4" name="Title 1">
-            <a:extLst>
-              <a:ext uri="{FF2B5EF4-FFF2-40B4-BE49-F238E27FC236}">
-                <a16:creationId xmlns:a16="http://schemas.microsoft.com/office/drawing/2014/main" id="{8601F684-217A-4629-B7AD-5F3397FCDA3E}"/>
-              </a:ext>
-            </a:extLst>
-          </p:cNvPr>
-          <p:cNvSpPr txBox="1">
-            <a:spLocks/>
-          </p:cNvSpPr>
-          <p:nvPr/>
-        </p:nvSpPr>
-        <p:spPr>
-          <a:xfrm>
-            <a:off x="838200" y="304801"/>
-            <a:ext cx="9986108" cy="789354"/>
-          </a:xfrm>
-          <a:prstGeom prst="rect">
-            <a:avLst/>
-          </a:prstGeom>
-        </p:spPr>
-        <p:txBody>
-          <a:bodyPr vert="horz" lIns="91440" tIns="45720" rIns="91440" bIns="45720" rtlCol="0" anchor="ctr">
-            <a:normAutofit fontScale="97500" lnSpcReduction="10000"/>
-          </a:bodyPr>
-          <a:lstStyle>
-            <a:lvl1pPr algn="l" defTabSz="914400" rtl="0" eaLnBrk="1" latinLnBrk="0" hangingPunct="1">
-              <a:lnSpc>
-                <a:spcPct val="90000"/>
-              </a:lnSpc>
-              <a:spcBef>
-                <a:spcPct val="0"/>
-              </a:spcBef>
-              <a:buNone/>
-              <a:defRPr sz="4400" kern="1200">
-                <a:solidFill>
-                  <a:schemeClr val="tx1"/>
-                </a:solidFill>
-                <a:latin typeface="+mj-lt"/>
-                <a:ea typeface="+mj-ea"/>
-                <a:cs typeface="+mj-cs"/>
-              </a:defRPr>
-            </a:lvl1pPr>
-          </a:lstStyle>
-          <a:p>
-            <a:r>
-              <a:rPr lang="de-CH" sz="5400" b="1" kern="150" dirty="0">
-                <a:latin typeface="Liberation Serif"/>
-                <a:ea typeface="Noto Serif CJK SC"/>
-                <a:cs typeface="Noto Sans Devanagari" panose="020B0502040504020204" pitchFamily="34" charset="0"/>
-              </a:rPr>
-              <a:t>Timeline und Verantwortungen:</a:t>
-            </a:r>
-            <a:endParaRPr lang="en-GB" sz="21500" b="1" dirty="0"/>
-          </a:p>
-        </p:txBody>
-      </p:sp>
-      <p:cxnSp>
-        <p:nvCxnSpPr>
-          <p:cNvPr id="5" name="Straight Connector 4">
-            <a:extLst>
-              <a:ext uri="{FF2B5EF4-FFF2-40B4-BE49-F238E27FC236}">
-                <a16:creationId xmlns:a16="http://schemas.microsoft.com/office/drawing/2014/main" id="{FA374583-E023-4EE4-ACC3-AB23AFC1B465}"/>
-              </a:ext>
-            </a:extLst>
-          </p:cNvPr>
-          <p:cNvCxnSpPr>
-            <a:cxnSpLocks/>
-          </p:cNvCxnSpPr>
-          <p:nvPr/>
-        </p:nvCxnSpPr>
-        <p:spPr>
-          <a:xfrm>
-            <a:off x="838200" y="922215"/>
-            <a:ext cx="10515600" cy="0"/>
-          </a:xfrm>
-          <a:prstGeom prst="line">
-            <a:avLst/>
-          </a:prstGeom>
-          <a:ln>
-            <a:solidFill>
-              <a:schemeClr val="tx1"/>
-            </a:solidFill>
-          </a:ln>
-        </p:spPr>
-        <p:style>
-          <a:lnRef idx="3">
-            <a:schemeClr val="dk1"/>
-          </a:lnRef>
-          <a:fillRef idx="0">
-            <a:schemeClr val="dk1"/>
-          </a:fillRef>
-          <a:effectRef idx="2">
-            <a:schemeClr val="dk1"/>
-          </a:effectRef>
-          <a:fontRef idx="minor">
-            <a:schemeClr val="tx1"/>
-          </a:fontRef>
-        </p:style>
-      </p:cxnSp>
-    </p:spTree>
-    <p:extLst>
-      <p:ext uri="{BB962C8B-B14F-4D97-AF65-F5344CB8AC3E}">
-        <p14:creationId xmlns:p14="http://schemas.microsoft.com/office/powerpoint/2010/main" val="3966488698"/>
-      </p:ext>
-    </p:extLst>
-  </p:cSld>
-  <p:clrMapOvr>
-    <a:masterClrMapping/>
-  </p:clrMapOvr>
-</p:sld>
-</file>
-
-<file path=ppt/slides/slide11.xml><?xml version="1.0" encoding="utf-8"?>
-<p:sld xmlns:a="http://schemas.openxmlformats.org/drawingml/2006/main" xmlns:r="http://schemas.openxmlformats.org/officeDocument/2006/relationships" xmlns:p="http://schemas.openxmlformats.org/presentationml/2006/main">
-  <p:cSld>
-    <p:spTree>
-      <p:nvGrpSpPr>
-        <p:cNvPr id="1" name=""/>
-        <p:cNvGrpSpPr/>
-        <p:nvPr/>
-      </p:nvGrpSpPr>
-      <p:grpSpPr>
-        <a:xfrm>
-          <a:off x="0" y="0"/>
-          <a:ext cx="0" cy="0"/>
-          <a:chOff x="0" y="0"/>
-          <a:chExt cx="0" cy="0"/>
-        </a:xfrm>
-      </p:grpSpPr>
-      <p:pic>
-        <p:nvPicPr>
           <p:cNvPr id="3" name="Picture 2" descr="Timeline&#10;&#10;Description automatically generated">
             <a:extLst>
               <a:ext uri="{FF2B5EF4-FFF2-40B4-BE49-F238E27FC236}">
@@ -4780,7 +4611,7 @@
 </p:sld>
 </file>
 
-<file path=ppt/slides/slide12.xml><?xml version="1.0" encoding="utf-8"?>
+<file path=ppt/slides/slide11.xml><?xml version="1.0" encoding="utf-8"?>
 <p:sld xmlns:a="http://schemas.openxmlformats.org/drawingml/2006/main" xmlns:r="http://schemas.openxmlformats.org/officeDocument/2006/relationships" xmlns:p="http://schemas.openxmlformats.org/presentationml/2006/main">
   <p:cSld>
     <p:spTree>
@@ -5137,6 +4968,30 @@
               </a:rPr>
               <a:t>cost</a:t>
             </a:r>
+            <a:endParaRPr lang="de-CH" kern="150" dirty="0">
+              <a:latin typeface="Liberation Serif"/>
+              <a:ea typeface="Noto Serif CJK SC"/>
+              <a:cs typeface="Noto Sans Devanagari" panose="020B0502040504020204" pitchFamily="34" charset="0"/>
+            </a:endParaRPr>
+          </a:p>
+          <a:p>
+            <a:r>
+              <a:rPr lang="de-CH" sz="2800" kern="150" dirty="0">
+                <a:effectLst/>
+                <a:latin typeface="Liberation Serif"/>
+                <a:ea typeface="Noto Serif CJK SC"/>
+                <a:cs typeface="Noto Sans Devanagari" panose="020B0502040504020204" pitchFamily="34" charset="0"/>
+              </a:rPr>
+              <a:t>Ziel: Erze </a:t>
+            </a:r>
+            <a:r>
+              <a:rPr lang="de-CH" kern="150" dirty="0">
+                <a:latin typeface="Liberation Serif"/>
+                <a:ea typeface="Noto Serif CJK SC"/>
+                <a:cs typeface="Noto Sans Devanagari" panose="020B0502040504020204" pitchFamily="34" charset="0"/>
+              </a:rPr>
+              <a:t>sammeln und Gegner zerstören</a:t>
+            </a:r>
             <a:endParaRPr lang="en-GB" sz="2800" kern="150" dirty="0">
               <a:effectLst/>
               <a:latin typeface="Liberation Serif"/>
@@ -5302,260 +5157,6 @@
           <p:cNvPr id="2" name="Title 1">
             <a:extLst>
               <a:ext uri="{FF2B5EF4-FFF2-40B4-BE49-F238E27FC236}">
-                <a16:creationId xmlns:a16="http://schemas.microsoft.com/office/drawing/2014/main" id="{5736070B-1A5A-4856-93AF-96E9EFF39588}"/>
-              </a:ext>
-            </a:extLst>
-          </p:cNvPr>
-          <p:cNvSpPr>
-            <a:spLocks noGrp="1"/>
-          </p:cNvSpPr>
-          <p:nvPr>
-            <p:ph type="title"/>
-          </p:nvPr>
-        </p:nvSpPr>
-        <p:spPr>
-          <a:xfrm>
-            <a:off x="838200" y="1094155"/>
-            <a:ext cx="10515600" cy="1325563"/>
-          </a:xfrm>
-        </p:spPr>
-        <p:txBody>
-          <a:bodyPr/>
-          <a:lstStyle/>
-          <a:p>
-            <a:r>
-              <a:rPr lang="de-CH" sz="4400" u="sng" kern="150" dirty="0">
-                <a:effectLst/>
-                <a:latin typeface="Liberation Serif"/>
-                <a:ea typeface="Noto Serif CJK SC"/>
-                <a:cs typeface="Noto Sans Devanagari" panose="020B0502040504020204" pitchFamily="34" charset="0"/>
-              </a:rPr>
-              <a:t>Spiel:</a:t>
-            </a:r>
-            <a:endParaRPr lang="en-GB" u="sng" dirty="0"/>
-          </a:p>
-        </p:txBody>
-      </p:sp>
-      <p:sp>
-        <p:nvSpPr>
-          <p:cNvPr id="3" name="Content Placeholder 2">
-            <a:extLst>
-              <a:ext uri="{FF2B5EF4-FFF2-40B4-BE49-F238E27FC236}">
-                <a16:creationId xmlns:a16="http://schemas.microsoft.com/office/drawing/2014/main" id="{E16CB743-F9EA-42C9-A6FF-5A7EC9A59568}"/>
-              </a:ext>
-            </a:extLst>
-          </p:cNvPr>
-          <p:cNvSpPr>
-            <a:spLocks noGrp="1"/>
-          </p:cNvSpPr>
-          <p:nvPr>
-            <p:ph idx="1"/>
-          </p:nvPr>
-        </p:nvSpPr>
-        <p:spPr>
-          <a:xfrm>
-            <a:off x="838200" y="2554655"/>
-            <a:ext cx="10515600" cy="4351338"/>
-          </a:xfrm>
-        </p:spPr>
-        <p:txBody>
-          <a:bodyPr/>
-          <a:lstStyle/>
-          <a:p>
-            <a:r>
-              <a:rPr lang="de-CH" sz="2800" kern="150" dirty="0">
-                <a:effectLst/>
-                <a:latin typeface="Liberation Serif"/>
-                <a:ea typeface="Noto Serif CJK SC"/>
-                <a:cs typeface="Noto Sans Devanagari" panose="020B0502040504020204" pitchFamily="34" charset="0"/>
-              </a:rPr>
-              <a:t>Es gibt ein n x m Brett auf welchem sich bewegt wird.</a:t>
-            </a:r>
-            <a:endParaRPr lang="en-GB" sz="2800" kern="150" dirty="0">
-              <a:effectLst/>
-              <a:latin typeface="Liberation Serif"/>
-              <a:ea typeface="Noto Serif CJK SC"/>
-              <a:cs typeface="Noto Sans Devanagari" panose="020B0502040504020204" pitchFamily="34" charset="0"/>
-            </a:endParaRPr>
-          </a:p>
-          <a:p>
-            <a:pPr algn="l"/>
-            <a:r>
-              <a:rPr lang="de-CH" sz="2800" kern="150" dirty="0">
-                <a:effectLst/>
-                <a:latin typeface="Liberation Serif"/>
-                <a:ea typeface="Noto Serif CJK SC"/>
-                <a:cs typeface="Noto Sans Devanagari" panose="020B0502040504020204" pitchFamily="34" charset="0"/>
-              </a:rPr>
-              <a:t>Verschiedene, Run-time veränderbare Erze.</a:t>
-            </a:r>
-            <a:endParaRPr lang="en-GB" sz="2800" kern="150" dirty="0">
-              <a:effectLst/>
-              <a:latin typeface="Liberation Serif"/>
-              <a:ea typeface="Noto Serif CJK SC"/>
-              <a:cs typeface="Noto Sans Devanagari" panose="020B0502040504020204" pitchFamily="34" charset="0"/>
-            </a:endParaRPr>
-          </a:p>
-          <a:p>
-            <a:pPr algn="l"/>
-            <a:r>
-              <a:rPr lang="de-CH" sz="2800" kern="150" dirty="0">
-                <a:effectLst/>
-                <a:latin typeface="Liberation Serif"/>
-                <a:ea typeface="Noto Serif CJK SC"/>
-                <a:cs typeface="Noto Sans Devanagari" panose="020B0502040504020204" pitchFamily="34" charset="0"/>
-              </a:rPr>
-              <a:t>Es gibt eine Aderverteilung anstelle einer Zellenverteilung.</a:t>
-            </a:r>
-            <a:endParaRPr lang="en-GB" sz="2800" kern="150" dirty="0">
-              <a:effectLst/>
-              <a:latin typeface="Liberation Serif"/>
-              <a:ea typeface="Noto Serif CJK SC"/>
-              <a:cs typeface="Noto Sans Devanagari" panose="020B0502040504020204" pitchFamily="34" charset="0"/>
-            </a:endParaRPr>
-          </a:p>
-          <a:p>
-            <a:endParaRPr lang="en-GB" dirty="0"/>
-          </a:p>
-        </p:txBody>
-      </p:sp>
-      <p:sp>
-        <p:nvSpPr>
-          <p:cNvPr id="6" name="Title 1">
-            <a:extLst>
-              <a:ext uri="{FF2B5EF4-FFF2-40B4-BE49-F238E27FC236}">
-                <a16:creationId xmlns:a16="http://schemas.microsoft.com/office/drawing/2014/main" id="{27BA6B29-7463-46E6-8715-B0BFFBBE3B69}"/>
-              </a:ext>
-            </a:extLst>
-          </p:cNvPr>
-          <p:cNvSpPr txBox="1">
-            <a:spLocks/>
-          </p:cNvSpPr>
-          <p:nvPr/>
-        </p:nvSpPr>
-        <p:spPr>
-          <a:xfrm>
-            <a:off x="838200" y="304801"/>
-            <a:ext cx="9144000" cy="789354"/>
-          </a:xfrm>
-          <a:prstGeom prst="rect">
-            <a:avLst/>
-          </a:prstGeom>
-        </p:spPr>
-        <p:txBody>
-          <a:bodyPr vert="horz" lIns="91440" tIns="45720" rIns="91440" bIns="45720" rtlCol="0" anchor="ctr">
-            <a:normAutofit fontScale="97500" lnSpcReduction="10000"/>
-          </a:bodyPr>
-          <a:lstStyle>
-            <a:lvl1pPr algn="l" defTabSz="914400" rtl="0" eaLnBrk="1" latinLnBrk="0" hangingPunct="1">
-              <a:lnSpc>
-                <a:spcPct val="90000"/>
-              </a:lnSpc>
-              <a:spcBef>
-                <a:spcPct val="0"/>
-              </a:spcBef>
-              <a:buNone/>
-              <a:defRPr sz="4400" kern="1200">
-                <a:solidFill>
-                  <a:schemeClr val="tx1"/>
-                </a:solidFill>
-                <a:latin typeface="+mj-lt"/>
-                <a:ea typeface="+mj-ea"/>
-                <a:cs typeface="+mj-cs"/>
-              </a:defRPr>
-            </a:lvl1pPr>
-          </a:lstStyle>
-          <a:p>
-            <a:r>
-              <a:rPr lang="de-CH" sz="5400" b="1" kern="150" dirty="0">
-                <a:latin typeface="Liberation Serif"/>
-                <a:ea typeface="Noto Serif CJK SC"/>
-                <a:cs typeface="Noto Sans Devanagari" panose="020B0502040504020204" pitchFamily="34" charset="0"/>
-              </a:rPr>
-              <a:t>Spielmechaniken:</a:t>
-            </a:r>
-            <a:endParaRPr lang="en-GB" sz="21500" b="1" dirty="0"/>
-          </a:p>
-        </p:txBody>
-      </p:sp>
-      <p:cxnSp>
-        <p:nvCxnSpPr>
-          <p:cNvPr id="5" name="Straight Connector 4">
-            <a:extLst>
-              <a:ext uri="{FF2B5EF4-FFF2-40B4-BE49-F238E27FC236}">
-                <a16:creationId xmlns:a16="http://schemas.microsoft.com/office/drawing/2014/main" id="{F532E1DD-1C1B-4DF7-8FC4-E34C5E4C9150}"/>
-              </a:ext>
-            </a:extLst>
-          </p:cNvPr>
-          <p:cNvCxnSpPr>
-            <a:cxnSpLocks/>
-          </p:cNvCxnSpPr>
-          <p:nvPr/>
-        </p:nvCxnSpPr>
-        <p:spPr>
-          <a:xfrm>
-            <a:off x="838200" y="922215"/>
-            <a:ext cx="10515600" cy="0"/>
-          </a:xfrm>
-          <a:prstGeom prst="line">
-            <a:avLst/>
-          </a:prstGeom>
-          <a:ln>
-            <a:solidFill>
-              <a:schemeClr val="tx1"/>
-            </a:solidFill>
-          </a:ln>
-        </p:spPr>
-        <p:style>
-          <a:lnRef idx="3">
-            <a:schemeClr val="dk1"/>
-          </a:lnRef>
-          <a:fillRef idx="0">
-            <a:schemeClr val="dk1"/>
-          </a:fillRef>
-          <a:effectRef idx="2">
-            <a:schemeClr val="dk1"/>
-          </a:effectRef>
-          <a:fontRef idx="minor">
-            <a:schemeClr val="tx1"/>
-          </a:fontRef>
-        </p:style>
-      </p:cxnSp>
-    </p:spTree>
-    <p:extLst>
-      <p:ext uri="{BB962C8B-B14F-4D97-AF65-F5344CB8AC3E}">
-        <p14:creationId xmlns:p14="http://schemas.microsoft.com/office/powerpoint/2010/main" val="3830637209"/>
-      </p:ext>
-    </p:extLst>
-  </p:cSld>
-  <p:clrMapOvr>
-    <a:masterClrMapping/>
-  </p:clrMapOvr>
-</p:sld>
-</file>
-
-<file path=ppt/slides/slide4.xml><?xml version="1.0" encoding="utf-8"?>
-<p:sld xmlns:a="http://schemas.openxmlformats.org/drawingml/2006/main" xmlns:r="http://schemas.openxmlformats.org/officeDocument/2006/relationships" xmlns:p="http://schemas.openxmlformats.org/presentationml/2006/main">
-  <p:cSld>
-    <p:spTree>
-      <p:nvGrpSpPr>
-        <p:cNvPr id="1" name=""/>
-        <p:cNvGrpSpPr/>
-        <p:nvPr/>
-      </p:nvGrpSpPr>
-      <p:grpSpPr>
-        <a:xfrm>
-          <a:off x="0" y="0"/>
-          <a:ext cx="0" cy="0"/>
-          <a:chOff x="0" y="0"/>
-          <a:chExt cx="0" cy="0"/>
-        </a:xfrm>
-      </p:grpSpPr>
-      <p:sp>
-        <p:nvSpPr>
-          <p:cNvPr id="2" name="Title 1">
-            <a:extLst>
-              <a:ext uri="{FF2B5EF4-FFF2-40B4-BE49-F238E27FC236}">
                 <a16:creationId xmlns:a16="http://schemas.microsoft.com/office/drawing/2014/main" id="{53E3ADC3-4892-4BBF-B1DD-E02B7C39F61E}"/>
               </a:ext>
             </a:extLst>
@@ -5897,7 +5498,7 @@
 </p:sld>
 </file>
 
-<file path=ppt/slides/slide5.xml><?xml version="1.0" encoding="utf-8"?>
+<file path=ppt/slides/slide4.xml><?xml version="1.0" encoding="utf-8"?>
 <p:sld xmlns:a="http://schemas.openxmlformats.org/drawingml/2006/main" xmlns:r="http://schemas.openxmlformats.org/officeDocument/2006/relationships" xmlns:p="http://schemas.openxmlformats.org/presentationml/2006/main">
   <p:cSld>
     <p:spTree>
@@ -6201,7 +5802,7 @@
 </p:sld>
 </file>
 
-<file path=ppt/slides/slide6.xml><?xml version="1.0" encoding="utf-8"?>
+<file path=ppt/slides/slide5.xml><?xml version="1.0" encoding="utf-8"?>
 <p:sld xmlns:a="http://schemas.openxmlformats.org/drawingml/2006/main" xmlns:r="http://schemas.openxmlformats.org/officeDocument/2006/relationships" xmlns:p="http://schemas.openxmlformats.org/presentationml/2006/main">
   <p:cSld>
     <p:spTree>
@@ -6832,7 +6433,7 @@
 </p:sld>
 </file>
 
-<file path=ppt/slides/slide7.xml><?xml version="1.0" encoding="utf-8"?>
+<file path=ppt/slides/slide6.xml><?xml version="1.0" encoding="utf-8"?>
 <p:sld xmlns:a="http://schemas.openxmlformats.org/drawingml/2006/main" xmlns:r="http://schemas.openxmlformats.org/officeDocument/2006/relationships" xmlns:p="http://schemas.openxmlformats.org/presentationml/2006/main">
   <p:cSld>
     <p:spTree>
@@ -7257,7 +6858,7 @@
 </p:sld>
 </file>
 
-<file path=ppt/slides/slide8.xml><?xml version="1.0" encoding="utf-8"?>
+<file path=ppt/slides/slide7.xml><?xml version="1.0" encoding="utf-8"?>
 <p:sld xmlns:a="http://schemas.openxmlformats.org/drawingml/2006/main" xmlns:r="http://schemas.openxmlformats.org/officeDocument/2006/relationships" xmlns:p="http://schemas.openxmlformats.org/presentationml/2006/main">
   <p:cSld>
     <p:spTree>
@@ -7510,7 +7111,7 @@
 </p:sld>
 </file>
 
-<file path=ppt/slides/slide9.xml><?xml version="1.0" encoding="utf-8"?>
+<file path=ppt/slides/slide8.xml><?xml version="1.0" encoding="utf-8"?>
 <p:sld xmlns:a="http://schemas.openxmlformats.org/drawingml/2006/main" xmlns:r="http://schemas.openxmlformats.org/officeDocument/2006/relationships" xmlns:p="http://schemas.openxmlformats.org/presentationml/2006/main">
   <p:cSld>
     <p:spTree>
@@ -7669,6 +7270,174 @@
     <p:extLst>
       <p:ext uri="{BB962C8B-B14F-4D97-AF65-F5344CB8AC3E}">
         <p14:creationId xmlns:p14="http://schemas.microsoft.com/office/powerpoint/2010/main" val="1447770352"/>
+      </p:ext>
+    </p:extLst>
+  </p:cSld>
+  <p:clrMapOvr>
+    <a:masterClrMapping/>
+  </p:clrMapOvr>
+</p:sld>
+</file>
+
+<file path=ppt/slides/slide9.xml><?xml version="1.0" encoding="utf-8"?>
+<p:sld xmlns:a="http://schemas.openxmlformats.org/drawingml/2006/main" xmlns:r="http://schemas.openxmlformats.org/officeDocument/2006/relationships" xmlns:p="http://schemas.openxmlformats.org/presentationml/2006/main">
+  <p:cSld>
+    <p:spTree>
+      <p:nvGrpSpPr>
+        <p:cNvPr id="1" name=""/>
+        <p:cNvGrpSpPr/>
+        <p:nvPr/>
+      </p:nvGrpSpPr>
+      <p:grpSpPr>
+        <a:xfrm>
+          <a:off x="0" y="0"/>
+          <a:ext cx="0" cy="0"/>
+          <a:chOff x="0" y="0"/>
+          <a:chExt cx="0" cy="0"/>
+        </a:xfrm>
+      </p:grpSpPr>
+      <p:pic>
+        <p:nvPicPr>
+          <p:cNvPr id="3" name="Picture 2" descr="Graphical user interface&#10;&#10;Description automatically generated with low confidence">
+            <a:extLst>
+              <a:ext uri="{FF2B5EF4-FFF2-40B4-BE49-F238E27FC236}">
+                <a16:creationId xmlns:a16="http://schemas.microsoft.com/office/drawing/2014/main" id="{58C58301-6A31-42E5-9CC3-E7191E81B312}"/>
+              </a:ext>
+            </a:extLst>
+          </p:cNvPr>
+          <p:cNvPicPr>
+            <a:picLocks noChangeAspect="1"/>
+          </p:cNvPicPr>
+          <p:nvPr/>
+        </p:nvPicPr>
+        <p:blipFill>
+          <a:blip r:embed="rId3">
+            <a:extLst>
+              <a:ext uri="{28A0092B-C50C-407E-A947-70E740481C1C}">
+                <a14:useLocalDpi xmlns:a14="http://schemas.microsoft.com/office/drawing/2010/main" val="0"/>
+              </a:ext>
+            </a:extLst>
+          </a:blip>
+          <a:stretch>
+            <a:fillRect/>
+          </a:stretch>
+        </p:blipFill>
+        <p:spPr>
+          <a:xfrm>
+            <a:off x="594536" y="1001789"/>
+            <a:ext cx="11002927" cy="5251397"/>
+          </a:xfrm>
+          <a:prstGeom prst="rect">
+            <a:avLst/>
+          </a:prstGeom>
+        </p:spPr>
+      </p:pic>
+      <p:sp>
+        <p:nvSpPr>
+          <p:cNvPr id="4" name="Title 1">
+            <a:extLst>
+              <a:ext uri="{FF2B5EF4-FFF2-40B4-BE49-F238E27FC236}">
+                <a16:creationId xmlns:a16="http://schemas.microsoft.com/office/drawing/2014/main" id="{8601F684-217A-4629-B7AD-5F3397FCDA3E}"/>
+              </a:ext>
+            </a:extLst>
+          </p:cNvPr>
+          <p:cNvSpPr txBox="1">
+            <a:spLocks/>
+          </p:cNvSpPr>
+          <p:nvPr/>
+        </p:nvSpPr>
+        <p:spPr>
+          <a:xfrm>
+            <a:off x="838200" y="304801"/>
+            <a:ext cx="9986108" cy="789354"/>
+          </a:xfrm>
+          <a:prstGeom prst="rect">
+            <a:avLst/>
+          </a:prstGeom>
+        </p:spPr>
+        <p:txBody>
+          <a:bodyPr vert="horz" lIns="91440" tIns="45720" rIns="91440" bIns="45720" rtlCol="0" anchor="ctr">
+            <a:normAutofit fontScale="97500" lnSpcReduction="10000"/>
+          </a:bodyPr>
+          <a:lstStyle>
+            <a:lvl1pPr algn="l" defTabSz="914400" rtl="0" eaLnBrk="1" latinLnBrk="0" hangingPunct="1">
+              <a:lnSpc>
+                <a:spcPct val="90000"/>
+              </a:lnSpc>
+              <a:spcBef>
+                <a:spcPct val="0"/>
+              </a:spcBef>
+              <a:buNone/>
+              <a:defRPr sz="4400" kern="1200">
+                <a:solidFill>
+                  <a:schemeClr val="tx1"/>
+                </a:solidFill>
+                <a:latin typeface="+mj-lt"/>
+                <a:ea typeface="+mj-ea"/>
+                <a:cs typeface="+mj-cs"/>
+              </a:defRPr>
+            </a:lvl1pPr>
+          </a:lstStyle>
+          <a:p>
+            <a:r>
+              <a:rPr lang="de-CH" sz="5400" b="1" kern="150" dirty="0">
+                <a:latin typeface="Liberation Serif"/>
+                <a:ea typeface="Noto Serif CJK SC"/>
+                <a:cs typeface="Noto Sans Devanagari" panose="020B0502040504020204" pitchFamily="34" charset="0"/>
+              </a:rPr>
+              <a:t>Timeline und Verantwortungen:</a:t>
+            </a:r>
+            <a:endParaRPr lang="en-GB" sz="21500" b="1" dirty="0"/>
+          </a:p>
+        </p:txBody>
+      </p:sp>
+      <p:cxnSp>
+        <p:nvCxnSpPr>
+          <p:cNvPr id="5" name="Straight Connector 4">
+            <a:extLst>
+              <a:ext uri="{FF2B5EF4-FFF2-40B4-BE49-F238E27FC236}">
+                <a16:creationId xmlns:a16="http://schemas.microsoft.com/office/drawing/2014/main" id="{FA374583-E023-4EE4-ACC3-AB23AFC1B465}"/>
+              </a:ext>
+            </a:extLst>
+          </p:cNvPr>
+          <p:cNvCxnSpPr>
+            <a:cxnSpLocks/>
+          </p:cNvCxnSpPr>
+          <p:nvPr/>
+        </p:nvCxnSpPr>
+        <p:spPr>
+          <a:xfrm>
+            <a:off x="838200" y="922215"/>
+            <a:ext cx="10515600" cy="0"/>
+          </a:xfrm>
+          <a:prstGeom prst="line">
+            <a:avLst/>
+          </a:prstGeom>
+          <a:ln>
+            <a:solidFill>
+              <a:schemeClr val="tx1"/>
+            </a:solidFill>
+          </a:ln>
+        </p:spPr>
+        <p:style>
+          <a:lnRef idx="3">
+            <a:schemeClr val="dk1"/>
+          </a:lnRef>
+          <a:fillRef idx="0">
+            <a:schemeClr val="dk1"/>
+          </a:fillRef>
+          <a:effectRef idx="2">
+            <a:schemeClr val="dk1"/>
+          </a:effectRef>
+          <a:fontRef idx="minor">
+            <a:schemeClr val="tx1"/>
+          </a:fontRef>
+        </p:style>
+      </p:cxnSp>
+    </p:spTree>
+    <p:extLst>
+      <p:ext uri="{BB962C8B-B14F-4D97-AF65-F5344CB8AC3E}">
+        <p14:creationId xmlns:p14="http://schemas.microsoft.com/office/powerpoint/2010/main" val="3966488698"/>
       </p:ext>
     </p:extLst>
   </p:cSld>

</xml_diff>

<commit_message>
Updated the Power Point Presentation to have the "Requirement Analysis" section
</commit_message>
<xml_diff>
--- a/documents/Milestone 1 - Presentation.pptx
+++ b/documents/Milestone 1 - Presentation.pptx
@@ -5,7 +5,7 @@
     <p:sldMasterId id="2147483648" r:id="rId1"/>
   </p:sldMasterIdLst>
   <p:notesMasterIdLst>
-    <p:notesMasterId r:id="rId13"/>
+    <p:notesMasterId r:id="rId14"/>
   </p:notesMasterIdLst>
   <p:sldIdLst>
     <p:sldId id="256" r:id="rId2"/>
@@ -13,12 +13,13 @@
     <p:sldId id="259" r:id="rId4"/>
     <p:sldId id="258" r:id="rId5"/>
     <p:sldId id="260" r:id="rId6"/>
-    <p:sldId id="262" r:id="rId7"/>
-    <p:sldId id="263" r:id="rId8"/>
-    <p:sldId id="264" r:id="rId9"/>
-    <p:sldId id="265" r:id="rId10"/>
-    <p:sldId id="266" r:id="rId11"/>
-    <p:sldId id="261" r:id="rId12"/>
+    <p:sldId id="267" r:id="rId7"/>
+    <p:sldId id="262" r:id="rId8"/>
+    <p:sldId id="263" r:id="rId9"/>
+    <p:sldId id="264" r:id="rId10"/>
+    <p:sldId id="265" r:id="rId11"/>
+    <p:sldId id="266" r:id="rId12"/>
+    <p:sldId id="261" r:id="rId13"/>
   </p:sldIdLst>
   <p:sldSz cx="12192000" cy="6858000"/>
   <p:notesSz cx="6858000" cy="9144000"/>
@@ -573,7 +574,7 @@
           <a:p>
             <a:fld id="{426195BF-5CD1-47F7-A647-173D71A99255}" type="slidenum">
               <a:rPr lang="LID4096" smtClean="0"/>
-              <a:t>7</a:t>
+              <a:t>8</a:t>
             </a:fld>
             <a:endParaRPr lang="LID4096"/>
           </a:p>
@@ -760,7 +761,7 @@
           <a:p>
             <a:fld id="{426195BF-5CD1-47F7-A647-173D71A99255}" type="slidenum">
               <a:rPr lang="LID4096" smtClean="0"/>
-              <a:t>8</a:t>
+              <a:t>9</a:t>
             </a:fld>
             <a:endParaRPr lang="LID4096"/>
           </a:p>
@@ -864,7 +865,7 @@
           <a:p>
             <a:fld id="{426195BF-5CD1-47F7-A647-173D71A99255}" type="slidenum">
               <a:rPr lang="LID4096" smtClean="0"/>
-              <a:t>9</a:t>
+              <a:t>10</a:t>
             </a:fld>
             <a:endParaRPr lang="LID4096"/>
           </a:p>
@@ -974,7 +975,7 @@
           <a:p>
             <a:fld id="{426195BF-5CD1-47F7-A647-173D71A99255}" type="slidenum">
               <a:rPr lang="LID4096" smtClean="0"/>
-              <a:t>10</a:t>
+              <a:t>11</a:t>
             </a:fld>
             <a:endParaRPr lang="LID4096"/>
           </a:p>
@@ -1102,7 +1103,7 @@
           <a:p>
             <a:fld id="{426195BF-5CD1-47F7-A647-173D71A99255}" type="slidenum">
               <a:rPr lang="LID4096" smtClean="0"/>
-              <a:t>11</a:t>
+              <a:t>12</a:t>
             </a:fld>
             <a:endParaRPr lang="LID4096"/>
           </a:p>
@@ -4462,6 +4463,174 @@
       </p:grpSpPr>
       <p:pic>
         <p:nvPicPr>
+          <p:cNvPr id="3" name="Picture 2" descr="Graphical user interface&#10;&#10;Description automatically generated with low confidence">
+            <a:extLst>
+              <a:ext uri="{FF2B5EF4-FFF2-40B4-BE49-F238E27FC236}">
+                <a16:creationId xmlns:a16="http://schemas.microsoft.com/office/drawing/2014/main" id="{58C58301-6A31-42E5-9CC3-E7191E81B312}"/>
+              </a:ext>
+            </a:extLst>
+          </p:cNvPr>
+          <p:cNvPicPr>
+            <a:picLocks noChangeAspect="1"/>
+          </p:cNvPicPr>
+          <p:nvPr/>
+        </p:nvPicPr>
+        <p:blipFill>
+          <a:blip r:embed="rId3">
+            <a:extLst>
+              <a:ext uri="{28A0092B-C50C-407E-A947-70E740481C1C}">
+                <a14:useLocalDpi xmlns:a14="http://schemas.microsoft.com/office/drawing/2010/main" val="0"/>
+              </a:ext>
+            </a:extLst>
+          </a:blip>
+          <a:stretch>
+            <a:fillRect/>
+          </a:stretch>
+        </p:blipFill>
+        <p:spPr>
+          <a:xfrm>
+            <a:off x="594536" y="1001789"/>
+            <a:ext cx="11002927" cy="5251397"/>
+          </a:xfrm>
+          <a:prstGeom prst="rect">
+            <a:avLst/>
+          </a:prstGeom>
+        </p:spPr>
+      </p:pic>
+      <p:sp>
+        <p:nvSpPr>
+          <p:cNvPr id="4" name="Title 1">
+            <a:extLst>
+              <a:ext uri="{FF2B5EF4-FFF2-40B4-BE49-F238E27FC236}">
+                <a16:creationId xmlns:a16="http://schemas.microsoft.com/office/drawing/2014/main" id="{8601F684-217A-4629-B7AD-5F3397FCDA3E}"/>
+              </a:ext>
+            </a:extLst>
+          </p:cNvPr>
+          <p:cNvSpPr txBox="1">
+            <a:spLocks/>
+          </p:cNvSpPr>
+          <p:nvPr/>
+        </p:nvSpPr>
+        <p:spPr>
+          <a:xfrm>
+            <a:off x="838200" y="304801"/>
+            <a:ext cx="9986108" cy="789354"/>
+          </a:xfrm>
+          <a:prstGeom prst="rect">
+            <a:avLst/>
+          </a:prstGeom>
+        </p:spPr>
+        <p:txBody>
+          <a:bodyPr vert="horz" lIns="91440" tIns="45720" rIns="91440" bIns="45720" rtlCol="0" anchor="ctr">
+            <a:normAutofit fontScale="97500" lnSpcReduction="10000"/>
+          </a:bodyPr>
+          <a:lstStyle>
+            <a:lvl1pPr algn="l" defTabSz="914400" rtl="0" eaLnBrk="1" latinLnBrk="0" hangingPunct="1">
+              <a:lnSpc>
+                <a:spcPct val="90000"/>
+              </a:lnSpc>
+              <a:spcBef>
+                <a:spcPct val="0"/>
+              </a:spcBef>
+              <a:buNone/>
+              <a:defRPr sz="4400" kern="1200">
+                <a:solidFill>
+                  <a:schemeClr val="tx1"/>
+                </a:solidFill>
+                <a:latin typeface="+mj-lt"/>
+                <a:ea typeface="+mj-ea"/>
+                <a:cs typeface="+mj-cs"/>
+              </a:defRPr>
+            </a:lvl1pPr>
+          </a:lstStyle>
+          <a:p>
+            <a:r>
+              <a:rPr lang="de-CH" sz="5400" b="1" kern="150" dirty="0">
+                <a:latin typeface="Liberation Serif"/>
+                <a:ea typeface="Noto Serif CJK SC"/>
+                <a:cs typeface="Noto Sans Devanagari" panose="020B0502040504020204" pitchFamily="34" charset="0"/>
+              </a:rPr>
+              <a:t>Timeline und Verantwortungen:</a:t>
+            </a:r>
+            <a:endParaRPr lang="en-GB" sz="21500" b="1" dirty="0"/>
+          </a:p>
+        </p:txBody>
+      </p:sp>
+      <p:cxnSp>
+        <p:nvCxnSpPr>
+          <p:cNvPr id="5" name="Straight Connector 4">
+            <a:extLst>
+              <a:ext uri="{FF2B5EF4-FFF2-40B4-BE49-F238E27FC236}">
+                <a16:creationId xmlns:a16="http://schemas.microsoft.com/office/drawing/2014/main" id="{FA374583-E023-4EE4-ACC3-AB23AFC1B465}"/>
+              </a:ext>
+            </a:extLst>
+          </p:cNvPr>
+          <p:cNvCxnSpPr>
+            <a:cxnSpLocks/>
+          </p:cNvCxnSpPr>
+          <p:nvPr/>
+        </p:nvCxnSpPr>
+        <p:spPr>
+          <a:xfrm>
+            <a:off x="838200" y="922215"/>
+            <a:ext cx="10515600" cy="0"/>
+          </a:xfrm>
+          <a:prstGeom prst="line">
+            <a:avLst/>
+          </a:prstGeom>
+          <a:ln>
+            <a:solidFill>
+              <a:schemeClr val="tx1"/>
+            </a:solidFill>
+          </a:ln>
+        </p:spPr>
+        <p:style>
+          <a:lnRef idx="3">
+            <a:schemeClr val="dk1"/>
+          </a:lnRef>
+          <a:fillRef idx="0">
+            <a:schemeClr val="dk1"/>
+          </a:fillRef>
+          <a:effectRef idx="2">
+            <a:schemeClr val="dk1"/>
+          </a:effectRef>
+          <a:fontRef idx="minor">
+            <a:schemeClr val="tx1"/>
+          </a:fontRef>
+        </p:style>
+      </p:cxnSp>
+    </p:spTree>
+    <p:extLst>
+      <p:ext uri="{BB962C8B-B14F-4D97-AF65-F5344CB8AC3E}">
+        <p14:creationId xmlns:p14="http://schemas.microsoft.com/office/powerpoint/2010/main" val="3966488698"/>
+      </p:ext>
+    </p:extLst>
+  </p:cSld>
+  <p:clrMapOvr>
+    <a:masterClrMapping/>
+  </p:clrMapOvr>
+</p:sld>
+</file>
+
+<file path=ppt/slides/slide11.xml><?xml version="1.0" encoding="utf-8"?>
+<p:sld xmlns:a="http://schemas.openxmlformats.org/drawingml/2006/main" xmlns:r="http://schemas.openxmlformats.org/officeDocument/2006/relationships" xmlns:p="http://schemas.openxmlformats.org/presentationml/2006/main">
+  <p:cSld>
+    <p:spTree>
+      <p:nvGrpSpPr>
+        <p:cNvPr id="1" name=""/>
+        <p:cNvGrpSpPr/>
+        <p:nvPr/>
+      </p:nvGrpSpPr>
+      <p:grpSpPr>
+        <a:xfrm>
+          <a:off x="0" y="0"/>
+          <a:ext cx="0" cy="0"/>
+          <a:chOff x="0" y="0"/>
+          <a:chExt cx="0" cy="0"/>
+        </a:xfrm>
+      </p:grpSpPr>
+      <p:pic>
+        <p:nvPicPr>
           <p:cNvPr id="3" name="Picture 2" descr="Timeline&#10;&#10;Description automatically generated">
             <a:extLst>
               <a:ext uri="{FF2B5EF4-FFF2-40B4-BE49-F238E27FC236}">
@@ -4611,7 +4780,7 @@
 </p:sld>
 </file>
 
-<file path=ppt/slides/slide11.xml><?xml version="1.0" encoding="utf-8"?>
+<file path=ppt/slides/slide12.xml><?xml version="1.0" encoding="utf-8"?>
 <p:sld xmlns:a="http://schemas.openxmlformats.org/drawingml/2006/main" xmlns:r="http://schemas.openxmlformats.org/officeDocument/2006/relationships" xmlns:p="http://schemas.openxmlformats.org/presentationml/2006/main">
   <p:cSld>
     <p:spTree>
@@ -6452,6 +6621,309 @@
       </p:grpSpPr>
       <p:sp>
         <p:nvSpPr>
+          <p:cNvPr id="3" name="Content Placeholder 2">
+            <a:extLst>
+              <a:ext uri="{FF2B5EF4-FFF2-40B4-BE49-F238E27FC236}">
+                <a16:creationId xmlns:a16="http://schemas.microsoft.com/office/drawing/2014/main" id="{D22F291B-CF2F-4000-A7A8-1339015C8865}"/>
+              </a:ext>
+            </a:extLst>
+          </p:cNvPr>
+          <p:cNvSpPr>
+            <a:spLocks noGrp="1"/>
+          </p:cNvSpPr>
+          <p:nvPr>
+            <p:ph idx="1"/>
+          </p:nvPr>
+        </p:nvSpPr>
+        <p:spPr>
+          <a:xfrm>
+            <a:off x="838200" y="1825625"/>
+            <a:ext cx="10515600" cy="4110157"/>
+          </a:xfrm>
+        </p:spPr>
+        <p:txBody>
+          <a:bodyPr numCol="1">
+            <a:normAutofit fontScale="92500" lnSpcReduction="10000"/>
+          </a:bodyPr>
+          <a:lstStyle/>
+          <a:p>
+            <a:pPr fontAlgn="base"/>
+            <a:r>
+              <a:rPr lang="de-CH" b="0" i="0" dirty="0">
+                <a:solidFill>
+                  <a:srgbClr val="000000"/>
+                </a:solidFill>
+                <a:effectLst/>
+                <a:latin typeface="inherit"/>
+              </a:rPr>
+              <a:t>Lobbysystem </a:t>
+            </a:r>
+          </a:p>
+          <a:p>
+            <a:pPr fontAlgn="base"/>
+            <a:r>
+              <a:rPr lang="de-CH" b="0" i="0" dirty="0">
+                <a:solidFill>
+                  <a:srgbClr val="000000"/>
+                </a:solidFill>
+                <a:effectLst/>
+                <a:latin typeface="inherit"/>
+              </a:rPr>
+              <a:t>Kommunikation </a:t>
+            </a:r>
+          </a:p>
+          <a:p>
+            <a:pPr fontAlgn="base"/>
+            <a:r>
+              <a:rPr lang="de-CH" b="0" i="0" dirty="0">
+                <a:solidFill>
+                  <a:srgbClr val="000000"/>
+                </a:solidFill>
+                <a:effectLst/>
+                <a:latin typeface="inherit"/>
+              </a:rPr>
+              <a:t>Lobbyrechte </a:t>
+            </a:r>
+          </a:p>
+          <a:p>
+            <a:pPr fontAlgn="base"/>
+            <a:r>
+              <a:rPr lang="de-CH" b="0" i="0" dirty="0">
+                <a:solidFill>
+                  <a:srgbClr val="000000"/>
+                </a:solidFill>
+                <a:effectLst/>
+                <a:latin typeface="inherit"/>
+              </a:rPr>
+              <a:t>Serververbindung </a:t>
+            </a:r>
+          </a:p>
+          <a:p>
+            <a:pPr fontAlgn="base"/>
+            <a:r>
+              <a:rPr lang="de-CH" b="0" i="0" dirty="0">
+                <a:solidFill>
+                  <a:srgbClr val="000000"/>
+                </a:solidFill>
+                <a:effectLst/>
+                <a:latin typeface="inherit"/>
+              </a:rPr>
+              <a:t>Spielgeschehnis </a:t>
+            </a:r>
+          </a:p>
+          <a:p>
+            <a:pPr fontAlgn="base"/>
+            <a:r>
+              <a:rPr lang="de-CH" b="0" i="0" dirty="0">
+                <a:solidFill>
+                  <a:srgbClr val="000000"/>
+                </a:solidFill>
+                <a:effectLst/>
+                <a:latin typeface="inherit"/>
+              </a:rPr>
+              <a:t>Aktualisierung/Synchronisierung </a:t>
+            </a:r>
+          </a:p>
+          <a:p>
+            <a:pPr fontAlgn="base"/>
+            <a:r>
+              <a:rPr lang="de-CH" b="0" i="0" dirty="0">
+                <a:solidFill>
+                  <a:srgbClr val="000000"/>
+                </a:solidFill>
+                <a:effectLst/>
+                <a:latin typeface="inherit"/>
+              </a:rPr>
+              <a:t>Ende des Spiels </a:t>
+            </a:r>
+          </a:p>
+          <a:p>
+            <a:pPr fontAlgn="base"/>
+            <a:r>
+              <a:rPr lang="de-CH" b="0" i="0">
+                <a:solidFill>
+                  <a:srgbClr val="000000"/>
+                </a:solidFill>
+                <a:effectLst/>
+                <a:latin typeface="inherit"/>
+              </a:rPr>
+              <a:t>GUI </a:t>
+            </a:r>
+            <a:endParaRPr lang="de-CH" b="0" i="0" dirty="0">
+              <a:solidFill>
+                <a:srgbClr val="000000"/>
+              </a:solidFill>
+              <a:effectLst/>
+              <a:latin typeface="inherit"/>
+            </a:endParaRPr>
+          </a:p>
+          <a:p>
+            <a:pPr fontAlgn="base"/>
+            <a:r>
+              <a:rPr lang="de-CH" b="0" i="0" dirty="0">
+                <a:solidFill>
+                  <a:srgbClr val="000000"/>
+                </a:solidFill>
+                <a:effectLst/>
+                <a:latin typeface="inherit"/>
+              </a:rPr>
+              <a:t>Steuerung</a:t>
+            </a:r>
+          </a:p>
+          <a:p>
+            <a:pPr fontAlgn="base"/>
+            <a:endParaRPr lang="de-CH" b="0" i="0" dirty="0">
+              <a:solidFill>
+                <a:srgbClr val="000000"/>
+              </a:solidFill>
+              <a:effectLst/>
+              <a:latin typeface="inherit"/>
+            </a:endParaRPr>
+          </a:p>
+        </p:txBody>
+      </p:sp>
+      <p:sp>
+        <p:nvSpPr>
+          <p:cNvPr id="11" name="Title 1">
+            <a:extLst>
+              <a:ext uri="{FF2B5EF4-FFF2-40B4-BE49-F238E27FC236}">
+                <a16:creationId xmlns:a16="http://schemas.microsoft.com/office/drawing/2014/main" id="{87E26BD4-D455-4876-B24E-CCD14F8FF1A4}"/>
+              </a:ext>
+            </a:extLst>
+          </p:cNvPr>
+          <p:cNvSpPr txBox="1">
+            <a:spLocks/>
+          </p:cNvSpPr>
+          <p:nvPr/>
+        </p:nvSpPr>
+        <p:spPr>
+          <a:xfrm>
+            <a:off x="838200" y="304801"/>
+            <a:ext cx="9144000" cy="789354"/>
+          </a:xfrm>
+          <a:prstGeom prst="rect">
+            <a:avLst/>
+          </a:prstGeom>
+        </p:spPr>
+        <p:txBody>
+          <a:bodyPr vert="horz" lIns="91440" tIns="45720" rIns="91440" bIns="45720" rtlCol="0" anchor="ctr">
+            <a:normAutofit fontScale="97500" lnSpcReduction="10000"/>
+          </a:bodyPr>
+          <a:lstStyle>
+            <a:lvl1pPr algn="l" defTabSz="914400" rtl="0" eaLnBrk="1" latinLnBrk="0" hangingPunct="1">
+              <a:lnSpc>
+                <a:spcPct val="90000"/>
+              </a:lnSpc>
+              <a:spcBef>
+                <a:spcPct val="0"/>
+              </a:spcBef>
+              <a:buNone/>
+              <a:defRPr sz="4400" kern="1200">
+                <a:solidFill>
+                  <a:schemeClr val="tx1"/>
+                </a:solidFill>
+                <a:latin typeface="+mj-lt"/>
+                <a:ea typeface="+mj-ea"/>
+                <a:cs typeface="+mj-cs"/>
+              </a:defRPr>
+            </a:lvl1pPr>
+          </a:lstStyle>
+          <a:p>
+            <a:r>
+              <a:rPr lang="de-CH" sz="5400" b="1" kern="150" dirty="0" err="1">
+                <a:latin typeface="Liberation Serif"/>
+                <a:ea typeface="Noto Serif CJK SC"/>
+                <a:cs typeface="Noto Sans Devanagari" panose="020B0502040504020204" pitchFamily="34" charset="0"/>
+              </a:rPr>
+              <a:t>Requirement</a:t>
+            </a:r>
+            <a:r>
+              <a:rPr lang="de-CH" sz="5400" b="1" kern="150" dirty="0">
+                <a:latin typeface="Liberation Serif"/>
+                <a:ea typeface="Noto Serif CJK SC"/>
+                <a:cs typeface="Noto Sans Devanagari" panose="020B0502040504020204" pitchFamily="34" charset="0"/>
+              </a:rPr>
+              <a:t> Analysis:</a:t>
+            </a:r>
+            <a:endParaRPr lang="en-GB" sz="21500" b="1" dirty="0"/>
+          </a:p>
+        </p:txBody>
+      </p:sp>
+      <p:cxnSp>
+        <p:nvCxnSpPr>
+          <p:cNvPr id="14" name="Straight Connector 13">
+            <a:extLst>
+              <a:ext uri="{FF2B5EF4-FFF2-40B4-BE49-F238E27FC236}">
+                <a16:creationId xmlns:a16="http://schemas.microsoft.com/office/drawing/2014/main" id="{267B2093-84CD-4846-BE4B-2ED63BB82999}"/>
+              </a:ext>
+            </a:extLst>
+          </p:cNvPr>
+          <p:cNvCxnSpPr>
+            <a:cxnSpLocks/>
+          </p:cNvCxnSpPr>
+          <p:nvPr/>
+        </p:nvCxnSpPr>
+        <p:spPr>
+          <a:xfrm>
+            <a:off x="838200" y="922215"/>
+            <a:ext cx="10515600" cy="0"/>
+          </a:xfrm>
+          <a:prstGeom prst="line">
+            <a:avLst/>
+          </a:prstGeom>
+          <a:ln>
+            <a:solidFill>
+              <a:schemeClr val="tx1"/>
+            </a:solidFill>
+          </a:ln>
+        </p:spPr>
+        <p:style>
+          <a:lnRef idx="3">
+            <a:schemeClr val="dk1"/>
+          </a:lnRef>
+          <a:fillRef idx="0">
+            <a:schemeClr val="dk1"/>
+          </a:fillRef>
+          <a:effectRef idx="2">
+            <a:schemeClr val="dk1"/>
+          </a:effectRef>
+          <a:fontRef idx="minor">
+            <a:schemeClr val="tx1"/>
+          </a:fontRef>
+        </p:style>
+      </p:cxnSp>
+    </p:spTree>
+    <p:extLst>
+      <p:ext uri="{BB962C8B-B14F-4D97-AF65-F5344CB8AC3E}">
+        <p14:creationId xmlns:p14="http://schemas.microsoft.com/office/powerpoint/2010/main" val="2696934979"/>
+      </p:ext>
+    </p:extLst>
+  </p:cSld>
+  <p:clrMapOvr>
+    <a:masterClrMapping/>
+  </p:clrMapOvr>
+</p:sld>
+</file>
+
+<file path=ppt/slides/slide7.xml><?xml version="1.0" encoding="utf-8"?>
+<p:sld xmlns:a="http://schemas.openxmlformats.org/drawingml/2006/main" xmlns:r="http://schemas.openxmlformats.org/officeDocument/2006/relationships" xmlns:p="http://schemas.openxmlformats.org/presentationml/2006/main">
+  <p:cSld>
+    <p:spTree>
+      <p:nvGrpSpPr>
+        <p:cNvPr id="1" name=""/>
+        <p:cNvGrpSpPr/>
+        <p:nvPr/>
+      </p:nvGrpSpPr>
+      <p:grpSpPr>
+        <a:xfrm>
+          <a:off x="0" y="0"/>
+          <a:ext cx="0" cy="0"/>
+          <a:chOff x="0" y="0"/>
+          <a:chExt cx="0" cy="0"/>
+        </a:xfrm>
+      </p:grpSpPr>
+      <p:sp>
+        <p:nvSpPr>
           <p:cNvPr id="3" name="TextBox 2">
             <a:extLst>
               <a:ext uri="{FF2B5EF4-FFF2-40B4-BE49-F238E27FC236}">
@@ -6858,7 +7330,7 @@
 </p:sld>
 </file>
 
-<file path=ppt/slides/slide7.xml><?xml version="1.0" encoding="utf-8"?>
+<file path=ppt/slides/slide8.xml><?xml version="1.0" encoding="utf-8"?>
 <p:sld xmlns:a="http://schemas.openxmlformats.org/drawingml/2006/main" xmlns:r="http://schemas.openxmlformats.org/officeDocument/2006/relationships" xmlns:p="http://schemas.openxmlformats.org/presentationml/2006/main">
   <p:cSld>
     <p:spTree>
@@ -7111,7 +7583,7 @@
 </p:sld>
 </file>
 
-<file path=ppt/slides/slide8.xml><?xml version="1.0" encoding="utf-8"?>
+<file path=ppt/slides/slide9.xml><?xml version="1.0" encoding="utf-8"?>
 <p:sld xmlns:a="http://schemas.openxmlformats.org/drawingml/2006/main" xmlns:r="http://schemas.openxmlformats.org/officeDocument/2006/relationships" xmlns:p="http://schemas.openxmlformats.org/presentationml/2006/main">
   <p:cSld>
     <p:spTree>
@@ -7270,174 +7742,6 @@
     <p:extLst>
       <p:ext uri="{BB962C8B-B14F-4D97-AF65-F5344CB8AC3E}">
         <p14:creationId xmlns:p14="http://schemas.microsoft.com/office/powerpoint/2010/main" val="1447770352"/>
-      </p:ext>
-    </p:extLst>
-  </p:cSld>
-  <p:clrMapOvr>
-    <a:masterClrMapping/>
-  </p:clrMapOvr>
-</p:sld>
-</file>
-
-<file path=ppt/slides/slide9.xml><?xml version="1.0" encoding="utf-8"?>
-<p:sld xmlns:a="http://schemas.openxmlformats.org/drawingml/2006/main" xmlns:r="http://schemas.openxmlformats.org/officeDocument/2006/relationships" xmlns:p="http://schemas.openxmlformats.org/presentationml/2006/main">
-  <p:cSld>
-    <p:spTree>
-      <p:nvGrpSpPr>
-        <p:cNvPr id="1" name=""/>
-        <p:cNvGrpSpPr/>
-        <p:nvPr/>
-      </p:nvGrpSpPr>
-      <p:grpSpPr>
-        <a:xfrm>
-          <a:off x="0" y="0"/>
-          <a:ext cx="0" cy="0"/>
-          <a:chOff x="0" y="0"/>
-          <a:chExt cx="0" cy="0"/>
-        </a:xfrm>
-      </p:grpSpPr>
-      <p:pic>
-        <p:nvPicPr>
-          <p:cNvPr id="3" name="Picture 2" descr="Graphical user interface&#10;&#10;Description automatically generated with low confidence">
-            <a:extLst>
-              <a:ext uri="{FF2B5EF4-FFF2-40B4-BE49-F238E27FC236}">
-                <a16:creationId xmlns:a16="http://schemas.microsoft.com/office/drawing/2014/main" id="{58C58301-6A31-42E5-9CC3-E7191E81B312}"/>
-              </a:ext>
-            </a:extLst>
-          </p:cNvPr>
-          <p:cNvPicPr>
-            <a:picLocks noChangeAspect="1"/>
-          </p:cNvPicPr>
-          <p:nvPr/>
-        </p:nvPicPr>
-        <p:blipFill>
-          <a:blip r:embed="rId3">
-            <a:extLst>
-              <a:ext uri="{28A0092B-C50C-407E-A947-70E740481C1C}">
-                <a14:useLocalDpi xmlns:a14="http://schemas.microsoft.com/office/drawing/2010/main" val="0"/>
-              </a:ext>
-            </a:extLst>
-          </a:blip>
-          <a:stretch>
-            <a:fillRect/>
-          </a:stretch>
-        </p:blipFill>
-        <p:spPr>
-          <a:xfrm>
-            <a:off x="594536" y="1001789"/>
-            <a:ext cx="11002927" cy="5251397"/>
-          </a:xfrm>
-          <a:prstGeom prst="rect">
-            <a:avLst/>
-          </a:prstGeom>
-        </p:spPr>
-      </p:pic>
-      <p:sp>
-        <p:nvSpPr>
-          <p:cNvPr id="4" name="Title 1">
-            <a:extLst>
-              <a:ext uri="{FF2B5EF4-FFF2-40B4-BE49-F238E27FC236}">
-                <a16:creationId xmlns:a16="http://schemas.microsoft.com/office/drawing/2014/main" id="{8601F684-217A-4629-B7AD-5F3397FCDA3E}"/>
-              </a:ext>
-            </a:extLst>
-          </p:cNvPr>
-          <p:cNvSpPr txBox="1">
-            <a:spLocks/>
-          </p:cNvSpPr>
-          <p:nvPr/>
-        </p:nvSpPr>
-        <p:spPr>
-          <a:xfrm>
-            <a:off x="838200" y="304801"/>
-            <a:ext cx="9986108" cy="789354"/>
-          </a:xfrm>
-          <a:prstGeom prst="rect">
-            <a:avLst/>
-          </a:prstGeom>
-        </p:spPr>
-        <p:txBody>
-          <a:bodyPr vert="horz" lIns="91440" tIns="45720" rIns="91440" bIns="45720" rtlCol="0" anchor="ctr">
-            <a:normAutofit fontScale="97500" lnSpcReduction="10000"/>
-          </a:bodyPr>
-          <a:lstStyle>
-            <a:lvl1pPr algn="l" defTabSz="914400" rtl="0" eaLnBrk="1" latinLnBrk="0" hangingPunct="1">
-              <a:lnSpc>
-                <a:spcPct val="90000"/>
-              </a:lnSpc>
-              <a:spcBef>
-                <a:spcPct val="0"/>
-              </a:spcBef>
-              <a:buNone/>
-              <a:defRPr sz="4400" kern="1200">
-                <a:solidFill>
-                  <a:schemeClr val="tx1"/>
-                </a:solidFill>
-                <a:latin typeface="+mj-lt"/>
-                <a:ea typeface="+mj-ea"/>
-                <a:cs typeface="+mj-cs"/>
-              </a:defRPr>
-            </a:lvl1pPr>
-          </a:lstStyle>
-          <a:p>
-            <a:r>
-              <a:rPr lang="de-CH" sz="5400" b="1" kern="150" dirty="0">
-                <a:latin typeface="Liberation Serif"/>
-                <a:ea typeface="Noto Serif CJK SC"/>
-                <a:cs typeface="Noto Sans Devanagari" panose="020B0502040504020204" pitchFamily="34" charset="0"/>
-              </a:rPr>
-              <a:t>Timeline und Verantwortungen:</a:t>
-            </a:r>
-            <a:endParaRPr lang="en-GB" sz="21500" b="1" dirty="0"/>
-          </a:p>
-        </p:txBody>
-      </p:sp>
-      <p:cxnSp>
-        <p:nvCxnSpPr>
-          <p:cNvPr id="5" name="Straight Connector 4">
-            <a:extLst>
-              <a:ext uri="{FF2B5EF4-FFF2-40B4-BE49-F238E27FC236}">
-                <a16:creationId xmlns:a16="http://schemas.microsoft.com/office/drawing/2014/main" id="{FA374583-E023-4EE4-ACC3-AB23AFC1B465}"/>
-              </a:ext>
-            </a:extLst>
-          </p:cNvPr>
-          <p:cNvCxnSpPr>
-            <a:cxnSpLocks/>
-          </p:cNvCxnSpPr>
-          <p:nvPr/>
-        </p:nvCxnSpPr>
-        <p:spPr>
-          <a:xfrm>
-            <a:off x="838200" y="922215"/>
-            <a:ext cx="10515600" cy="0"/>
-          </a:xfrm>
-          <a:prstGeom prst="line">
-            <a:avLst/>
-          </a:prstGeom>
-          <a:ln>
-            <a:solidFill>
-              <a:schemeClr val="tx1"/>
-            </a:solidFill>
-          </a:ln>
-        </p:spPr>
-        <p:style>
-          <a:lnRef idx="3">
-            <a:schemeClr val="dk1"/>
-          </a:lnRef>
-          <a:fillRef idx="0">
-            <a:schemeClr val="dk1"/>
-          </a:fillRef>
-          <a:effectRef idx="2">
-            <a:schemeClr val="dk1"/>
-          </a:effectRef>
-          <a:fontRef idx="minor">
-            <a:schemeClr val="tx1"/>
-          </a:fontRef>
-        </p:style>
-      </p:cxnSp>
-    </p:spTree>
-    <p:extLst>
-      <p:ext uri="{BB962C8B-B14F-4D97-AF65-F5344CB8AC3E}">
-        <p14:creationId xmlns:p14="http://schemas.microsoft.com/office/powerpoint/2010/main" val="3966488698"/>
       </p:ext>
     </p:extLst>
   </p:cSld>

</xml_diff>

<commit_message>
Replace Milestone 1 - Presentation.pptx
</commit_message>
<xml_diff>
--- a/documents/Milestone 1 - Presentation.pptx
+++ b/documents/Milestone 1 - Presentation.pptx
@@ -6637,19 +6637,18 @@
         </p:nvSpPr>
         <p:spPr>
           <a:xfrm>
-            <a:off x="838200" y="1825625"/>
-            <a:ext cx="10515600" cy="4110157"/>
+            <a:off x="838200" y="1825626"/>
+            <a:ext cx="10515600" cy="4388562"/>
           </a:xfrm>
         </p:spPr>
         <p:txBody>
           <a:bodyPr numCol="1">
-            <a:normAutofit fontScale="92500" lnSpcReduction="10000"/>
+            <a:normAutofit/>
           </a:bodyPr>
           <a:lstStyle/>
           <a:p>
-            <a:pPr fontAlgn="base"/>
-            <a:r>
-              <a:rPr lang="de-CH" b="0" i="0" dirty="0">
+            <a:r>
+              <a:rPr lang="de-DE" b="0" i="0" dirty="0">
                 <a:solidFill>
                   <a:srgbClr val="000000"/>
                 </a:solidFill>
@@ -6660,9 +6659,8 @@
             </a:r>
           </a:p>
           <a:p>
-            <a:pPr fontAlgn="base"/>
-            <a:r>
-              <a:rPr lang="de-CH" b="0" i="0" dirty="0">
+            <a:r>
+              <a:rPr lang="de-DE" b="0" i="0" dirty="0">
                 <a:solidFill>
                   <a:srgbClr val="000000"/>
                 </a:solidFill>
@@ -6673,9 +6671,8 @@
             </a:r>
           </a:p>
           <a:p>
-            <a:pPr fontAlgn="base"/>
-            <a:r>
-              <a:rPr lang="de-CH" b="0" i="0" dirty="0">
+            <a:r>
+              <a:rPr lang="de-DE" b="0" i="0" dirty="0">
                 <a:solidFill>
                   <a:srgbClr val="000000"/>
                 </a:solidFill>
@@ -6686,9 +6683,8 @@
             </a:r>
           </a:p>
           <a:p>
-            <a:pPr fontAlgn="base"/>
-            <a:r>
-              <a:rPr lang="de-CH" b="0" i="0" dirty="0">
+            <a:r>
+              <a:rPr lang="de-DE" b="0" i="0" dirty="0">
                 <a:solidFill>
                   <a:srgbClr val="000000"/>
                 </a:solidFill>
@@ -6699,57 +6695,59 @@
             </a:r>
           </a:p>
           <a:p>
-            <a:pPr fontAlgn="base"/>
-            <a:r>
-              <a:rPr lang="de-CH" b="0" i="0" dirty="0">
+            <a:r>
+              <a:rPr lang="de-DE" b="0" i="0" dirty="0" err="1">
                 <a:solidFill>
                   <a:srgbClr val="000000"/>
                 </a:solidFill>
                 <a:effectLst/>
                 <a:latin typeface="inherit"/>
               </a:rPr>
-              <a:t>Spielgeschehnis </a:t>
-            </a:r>
-          </a:p>
-          <a:p>
-            <a:pPr fontAlgn="base"/>
-            <a:r>
-              <a:rPr lang="de-CH" b="0" i="0" dirty="0">
+              <a:t>Spielgeschehniss</a:t>
+            </a:r>
+            <a:r>
+              <a:rPr lang="de-DE" b="0" i="0" dirty="0">
                 <a:solidFill>
                   <a:srgbClr val="000000"/>
                 </a:solidFill>
                 <a:effectLst/>
                 <a:latin typeface="inherit"/>
               </a:rPr>
-              <a:t>Aktualisierung/Synchronisierung </a:t>
-            </a:r>
-          </a:p>
-          <a:p>
-            <a:pPr fontAlgn="base"/>
-            <a:r>
-              <a:rPr lang="de-CH" b="0" i="0" dirty="0">
+              <a:t> </a:t>
+            </a:r>
+          </a:p>
+          <a:p>
+            <a:r>
+              <a:rPr lang="de-DE" b="0" i="0" dirty="0" err="1">
                 <a:solidFill>
                   <a:srgbClr val="000000"/>
                 </a:solidFill>
                 <a:effectLst/>
                 <a:latin typeface="inherit"/>
               </a:rPr>
-              <a:t>Ende des Spiels </a:t>
-            </a:r>
-          </a:p>
-          <a:p>
-            <a:pPr fontAlgn="base"/>
-            <a:r>
-              <a:rPr lang="de-CH" b="0" i="0">
+              <a:t>Aktualiesierung</a:t>
+            </a:r>
+            <a:r>
+              <a:rPr lang="de-DE" b="0" i="0" dirty="0">
                 <a:solidFill>
                   <a:srgbClr val="000000"/>
                 </a:solidFill>
                 <a:effectLst/>
                 <a:latin typeface="inherit"/>
               </a:rPr>
-              <a:t>GUI </a:t>
-            </a:r>
-            <a:endParaRPr lang="de-CH" b="0" i="0" dirty="0">
+              <a:t>/</a:t>
+            </a:r>
+            <a:r>
+              <a:rPr lang="de-DE" b="0" i="0" dirty="0" err="1">
+                <a:solidFill>
+                  <a:srgbClr val="000000"/>
+                </a:solidFill>
+                <a:effectLst/>
+                <a:latin typeface="inherit"/>
+              </a:rPr>
+              <a:t>Snchronisierung</a:t>
+            </a:r>
+            <a:endParaRPr lang="de-DE" b="0" i="0" dirty="0">
               <a:solidFill>
                 <a:srgbClr val="000000"/>
               </a:solidFill>
@@ -6758,27 +6756,127 @@
             </a:endParaRPr>
           </a:p>
           <a:p>
-            <a:pPr fontAlgn="base"/>
-            <a:r>
-              <a:rPr lang="de-CH" b="0" i="0" dirty="0">
+            <a:r>
+              <a:rPr lang="de-DE" b="0" i="0" dirty="0">
                 <a:solidFill>
                   <a:srgbClr val="000000"/>
                 </a:solidFill>
                 <a:effectLst/>
                 <a:latin typeface="inherit"/>
               </a:rPr>
-              <a:t>Steuerung</a:t>
-            </a:r>
-          </a:p>
-          <a:p>
-            <a:pPr fontAlgn="base"/>
-            <a:endParaRPr lang="de-CH" b="0" i="0" dirty="0">
-              <a:solidFill>
-                <a:srgbClr val="000000"/>
-              </a:solidFill>
+              <a:t> Ende des Spiels</a:t>
+            </a:r>
+          </a:p>
+          <a:p>
+            <a:r>
+              <a:rPr lang="de-DE" b="0" i="0" dirty="0">
+                <a:solidFill>
+                  <a:srgbClr val="000000"/>
+                </a:solidFill>
+                <a:effectLst/>
+                <a:latin typeface="inherit"/>
+              </a:rPr>
+              <a:t> </a:t>
+            </a:r>
+            <a:r>
+              <a:rPr lang="de-DE" b="0" i="0" dirty="0" err="1">
+                <a:solidFill>
+                  <a:srgbClr val="000000"/>
+                </a:solidFill>
+                <a:effectLst/>
+                <a:latin typeface="inherit"/>
+              </a:rPr>
+              <a:t>Gui</a:t>
+            </a:r>
+            <a:r>
+              <a:rPr lang="de-DE" b="0" i="0" dirty="0">
+                <a:solidFill>
+                  <a:srgbClr val="000000"/>
+                </a:solidFill>
+                <a:effectLst/>
+                <a:latin typeface="inherit"/>
+              </a:rPr>
+              <a:t> Steuerung</a:t>
+            </a:r>
+          </a:p>
+          <a:p>
+            <a:endParaRPr lang="de-CH" kern="150" dirty="0">
+              <a:latin typeface="Liberation Serif"/>
+              <a:ea typeface="Noto Serif CJK SC"/>
+              <a:cs typeface="Noto Sans Devanagari" panose="020B0502040504020204" pitchFamily="34" charset="0"/>
+            </a:endParaRPr>
+          </a:p>
+          <a:p>
+            <a:endParaRPr lang="de-CH" kern="150" dirty="0">
               <a:effectLst/>
-              <a:latin typeface="inherit"/>
+              <a:latin typeface="Liberation Serif"/>
+              <a:ea typeface="Noto Serif CJK SC"/>
+              <a:cs typeface="Noto Sans Devanagari" panose="020B0502040504020204" pitchFamily="34" charset="0"/>
             </a:endParaRPr>
+          </a:p>
+          <a:p>
+            <a:endParaRPr lang="de-CH" kern="150" dirty="0">
+              <a:latin typeface="Liberation Serif"/>
+              <a:ea typeface="Noto Serif CJK SC"/>
+              <a:cs typeface="Noto Sans Devanagari" panose="020B0502040504020204" pitchFamily="34" charset="0"/>
+            </a:endParaRPr>
+          </a:p>
+          <a:p>
+            <a:endParaRPr lang="de-CH" kern="150" dirty="0">
+              <a:effectLst/>
+              <a:latin typeface="Liberation Serif"/>
+              <a:ea typeface="Noto Serif CJK SC"/>
+              <a:cs typeface="Noto Sans Devanagari" panose="020B0502040504020204" pitchFamily="34" charset="0"/>
+            </a:endParaRPr>
+          </a:p>
+          <a:p>
+            <a:endParaRPr lang="de-CH" kern="150" dirty="0">
+              <a:latin typeface="Liberation Serif"/>
+              <a:ea typeface="Noto Serif CJK SC"/>
+              <a:cs typeface="Noto Sans Devanagari" panose="020B0502040504020204" pitchFamily="34" charset="0"/>
+            </a:endParaRPr>
+          </a:p>
+          <a:p>
+            <a:endParaRPr lang="de-CH" kern="150" dirty="0">
+              <a:effectLst/>
+              <a:latin typeface="Liberation Serif"/>
+              <a:ea typeface="Noto Serif CJK SC"/>
+              <a:cs typeface="Noto Sans Devanagari" panose="020B0502040504020204" pitchFamily="34" charset="0"/>
+            </a:endParaRPr>
+          </a:p>
+          <a:p>
+            <a:endParaRPr lang="de-CH" kern="150" dirty="0">
+              <a:latin typeface="Liberation Serif"/>
+              <a:ea typeface="Noto Serif CJK SC"/>
+              <a:cs typeface="Noto Sans Devanagari" panose="020B0502040504020204" pitchFamily="34" charset="0"/>
+            </a:endParaRPr>
+          </a:p>
+          <a:p>
+            <a:endParaRPr lang="de-CH" kern="150" dirty="0">
+              <a:effectLst/>
+              <a:latin typeface="Liberation Serif"/>
+              <a:ea typeface="Noto Serif CJK SC"/>
+              <a:cs typeface="Noto Sans Devanagari" panose="020B0502040504020204" pitchFamily="34" charset="0"/>
+            </a:endParaRPr>
+          </a:p>
+          <a:p>
+            <a:endParaRPr lang="en-GB" kern="150" dirty="0">
+              <a:effectLst/>
+              <a:latin typeface="Liberation Serif"/>
+              <a:ea typeface="Noto Serif CJK SC"/>
+              <a:cs typeface="Noto Sans Devanagari" panose="020B0502040504020204" pitchFamily="34" charset="0"/>
+            </a:endParaRPr>
+          </a:p>
+          <a:p>
+            <a:endParaRPr lang="en-GB" kern="150" dirty="0">
+              <a:effectLst/>
+              <a:latin typeface="Liberation Serif"/>
+              <a:ea typeface="Noto Serif CJK SC"/>
+              <a:cs typeface="Noto Sans Devanagari" panose="020B0502040504020204" pitchFamily="34" charset="0"/>
+            </a:endParaRPr>
+          </a:p>
+          <a:p>
+            <a:endParaRPr lang="en-GB" sz="4000" dirty="0"/>
           </a:p>
         </p:txBody>
       </p:sp>
@@ -6798,7 +6896,7 @@
         </p:nvSpPr>
         <p:spPr>
           <a:xfrm>
-            <a:off x="838200" y="304801"/>
+            <a:off x="912845" y="249135"/>
             <a:ext cx="9144000" cy="789354"/>
           </a:xfrm>
           <a:prstGeom prst="rect">
@@ -6843,7 +6941,7 @@
                 <a:ea typeface="Noto Serif CJK SC"/>
                 <a:cs typeface="Noto Sans Devanagari" panose="020B0502040504020204" pitchFamily="34" charset="0"/>
               </a:rPr>
-              <a:t> Analysis:</a:t>
+              <a:t> Analysis</a:t>
             </a:r>
             <a:endParaRPr lang="en-GB" sz="21500" b="1" dirty="0"/>
           </a:p>
@@ -6895,7 +6993,7 @@
     </p:spTree>
     <p:extLst>
       <p:ext uri="{BB962C8B-B14F-4D97-AF65-F5344CB8AC3E}">
-        <p14:creationId xmlns:p14="http://schemas.microsoft.com/office/powerpoint/2010/main" val="2696934979"/>
+        <p14:creationId xmlns:p14="http://schemas.microsoft.com/office/powerpoint/2010/main" val="1370241073"/>
       </p:ext>
     </p:extLst>
   </p:cSld>

</xml_diff>